<commit_message>
forgot the pdf file when added the visualization figure
</commit_message>
<xml_diff>
--- a/Documentation/VGF_code_figures.pptx
+++ b/Documentation/VGF_code_figures.pptx
@@ -17,6 +17,7 @@
     <p:sldId id="259" r:id="rId14"/>
     <p:sldId id="263" r:id="rId15"/>
     <p:sldId id="267" r:id="rId16"/>
+    <p:sldId id="268" r:id="rId17"/>
   </p:sldIdLst>
   <p:sldSz cx="12192000" cy="6858000"/>
   <p:notesSz cx="6858000" cy="9144000"/>
@@ -126,7 +127,7 @@
 <file path=ppt/revisionInfo.xml><?xml version="1.0" encoding="utf-8"?>
 <p1510:revInfo xmlns:a="http://schemas.openxmlformats.org/drawingml/2006/main" xmlns:r="http://schemas.openxmlformats.org/officeDocument/2006/relationships" xmlns:p1510="http://schemas.microsoft.com/office/powerpoint/2015/10/main">
   <p1510:revLst>
-    <p1510:client id="{02CA5E3B-2C2A-49A7-A9CA-5AC791557465}" v="2" dt="2020-10-29T15:52:49.541"/>
+    <p1510:client id="{BAC4D229-ADA6-4827-B77F-B2E2B00DC38D}" v="1" dt="2022-02-11T17:53:12.604"/>
   </p1510:revLst>
 </p1510:revInfo>
 </file>
@@ -374,6 +375,30 @@
             <pc:docMk/>
             <pc:sldMk cId="3876911251" sldId="267"/>
             <ac:picMk id="7" creationId="{0D6C0434-059C-4B7D-B0C6-0D201CA0BE06}"/>
+          </ac:picMkLst>
+        </pc:picChg>
+      </pc:sldChg>
+    </pc:docChg>
+  </pc:docChgLst>
+  <pc:docChgLst>
+    <pc:chgData name="Lines, Todd" userId="afaf7c3a-e8aa-4568-882a-02ad8f9e19b0" providerId="ADAL" clId="{BAC4D229-ADA6-4827-B77F-B2E2B00DC38D}"/>
+    <pc:docChg chg="addSld modSld">
+      <pc:chgData name="Lines, Todd" userId="afaf7c3a-e8aa-4568-882a-02ad8f9e19b0" providerId="ADAL" clId="{BAC4D229-ADA6-4827-B77F-B2E2B00DC38D}" dt="2022-02-11T17:53:12.604" v="1"/>
+      <pc:docMkLst>
+        <pc:docMk/>
+      </pc:docMkLst>
+      <pc:sldChg chg="addSp modSp new">
+        <pc:chgData name="Lines, Todd" userId="afaf7c3a-e8aa-4568-882a-02ad8f9e19b0" providerId="ADAL" clId="{BAC4D229-ADA6-4827-B77F-B2E2B00DC38D}" dt="2022-02-11T17:53:12.604" v="1"/>
+        <pc:sldMkLst>
+          <pc:docMk/>
+          <pc:sldMk cId="2797949818" sldId="268"/>
+        </pc:sldMkLst>
+        <pc:picChg chg="add mod">
+          <ac:chgData name="Lines, Todd" userId="afaf7c3a-e8aa-4568-882a-02ad8f9e19b0" providerId="ADAL" clId="{BAC4D229-ADA6-4827-B77F-B2E2B00DC38D}" dt="2022-02-11T17:53:12.604" v="1"/>
+          <ac:picMkLst>
+            <pc:docMk/>
+            <pc:sldMk cId="2797949818" sldId="268"/>
+            <ac:picMk id="4" creationId="{27B85621-8AD9-4EC3-84D3-543D94F047CE}"/>
           </ac:picMkLst>
         </pc:picChg>
       </pc:sldChg>
@@ -1847,7 +1872,7 @@
           <a:p>
             <a:fld id="{35089887-6BA4-49BE-A939-BC4774AC5008}" type="datetimeFigureOut">
               <a:rPr lang="en-US" smtClean="0"/>
-              <a:t>10/29/2020</a:t>
+              <a:t>2/11/2022</a:t>
             </a:fld>
             <a:endParaRPr lang="en-US"/>
           </a:p>
@@ -2045,7 +2070,7 @@
           <a:p>
             <a:fld id="{35089887-6BA4-49BE-A939-BC4774AC5008}" type="datetimeFigureOut">
               <a:rPr lang="en-US" smtClean="0"/>
-              <a:t>10/29/2020</a:t>
+              <a:t>2/11/2022</a:t>
             </a:fld>
             <a:endParaRPr lang="en-US"/>
           </a:p>
@@ -2253,7 +2278,7 @@
           <a:p>
             <a:fld id="{35089887-6BA4-49BE-A939-BC4774AC5008}" type="datetimeFigureOut">
               <a:rPr lang="en-US" smtClean="0"/>
-              <a:t>10/29/2020</a:t>
+              <a:t>2/11/2022</a:t>
             </a:fld>
             <a:endParaRPr lang="en-US"/>
           </a:p>
@@ -2451,7 +2476,7 @@
           <a:p>
             <a:fld id="{35089887-6BA4-49BE-A939-BC4774AC5008}" type="datetimeFigureOut">
               <a:rPr lang="en-US" smtClean="0"/>
-              <a:t>10/29/2020</a:t>
+              <a:t>2/11/2022</a:t>
             </a:fld>
             <a:endParaRPr lang="en-US"/>
           </a:p>
@@ -2726,7 +2751,7 @@
           <a:p>
             <a:fld id="{35089887-6BA4-49BE-A939-BC4774AC5008}" type="datetimeFigureOut">
               <a:rPr lang="en-US" smtClean="0"/>
-              <a:t>10/29/2020</a:t>
+              <a:t>2/11/2022</a:t>
             </a:fld>
             <a:endParaRPr lang="en-US"/>
           </a:p>
@@ -2991,7 +3016,7 @@
           <a:p>
             <a:fld id="{35089887-6BA4-49BE-A939-BC4774AC5008}" type="datetimeFigureOut">
               <a:rPr lang="en-US" smtClean="0"/>
-              <a:t>10/29/2020</a:t>
+              <a:t>2/11/2022</a:t>
             </a:fld>
             <a:endParaRPr lang="en-US"/>
           </a:p>
@@ -3403,7 +3428,7 @@
           <a:p>
             <a:fld id="{35089887-6BA4-49BE-A939-BC4774AC5008}" type="datetimeFigureOut">
               <a:rPr lang="en-US" smtClean="0"/>
-              <a:t>10/29/2020</a:t>
+              <a:t>2/11/2022</a:t>
             </a:fld>
             <a:endParaRPr lang="en-US"/>
           </a:p>
@@ -3544,7 +3569,7 @@
           <a:p>
             <a:fld id="{35089887-6BA4-49BE-A939-BC4774AC5008}" type="datetimeFigureOut">
               <a:rPr lang="en-US" smtClean="0"/>
-              <a:t>10/29/2020</a:t>
+              <a:t>2/11/2022</a:t>
             </a:fld>
             <a:endParaRPr lang="en-US"/>
           </a:p>
@@ -3657,7 +3682,7 @@
           <a:p>
             <a:fld id="{35089887-6BA4-49BE-A939-BC4774AC5008}" type="datetimeFigureOut">
               <a:rPr lang="en-US" smtClean="0"/>
-              <a:t>10/29/2020</a:t>
+              <a:t>2/11/2022</a:t>
             </a:fld>
             <a:endParaRPr lang="en-US"/>
           </a:p>
@@ -3968,7 +3993,7 @@
           <a:p>
             <a:fld id="{35089887-6BA4-49BE-A939-BC4774AC5008}" type="datetimeFigureOut">
               <a:rPr lang="en-US" smtClean="0"/>
-              <a:t>10/29/2020</a:t>
+              <a:t>2/11/2022</a:t>
             </a:fld>
             <a:endParaRPr lang="en-US"/>
           </a:p>
@@ -4256,7 +4281,7 @@
           <a:p>
             <a:fld id="{35089887-6BA4-49BE-A939-BC4774AC5008}" type="datetimeFigureOut">
               <a:rPr lang="en-US" smtClean="0"/>
-              <a:t>10/29/2020</a:t>
+              <a:t>2/11/2022</a:t>
             </a:fld>
             <a:endParaRPr lang="en-US"/>
           </a:p>
@@ -4497,7 +4522,7 @@
           <a:p>
             <a:fld id="{35089887-6BA4-49BE-A939-BC4774AC5008}" type="datetimeFigureOut">
               <a:rPr lang="en-US" smtClean="0"/>
-              <a:t>10/29/2020</a:t>
+              <a:t>2/11/2022</a:t>
             </a:fld>
             <a:endParaRPr lang="en-US"/>
           </a:p>
@@ -9436,6 +9461,116 @@
 </p:sld>
 </file>
 
+<file path=ppt/slides/slide13.xml><?xml version="1.0" encoding="utf-8"?>
+<p:sld xmlns:a="http://schemas.openxmlformats.org/drawingml/2006/main" xmlns:r="http://schemas.openxmlformats.org/officeDocument/2006/relationships" xmlns:p="http://schemas.openxmlformats.org/presentationml/2006/main">
+  <p:cSld>
+    <p:spTree>
+      <p:nvGrpSpPr>
+        <p:cNvPr id="1" name=""/>
+        <p:cNvGrpSpPr/>
+        <p:nvPr/>
+      </p:nvGrpSpPr>
+      <p:grpSpPr>
+        <a:xfrm>
+          <a:off x="0" y="0"/>
+          <a:ext cx="0" cy="0"/>
+          <a:chOff x="0" y="0"/>
+          <a:chExt cx="0" cy="0"/>
+        </a:xfrm>
+      </p:grpSpPr>
+      <p:sp>
+        <p:nvSpPr>
+          <p:cNvPr id="2" name="Title 1">
+            <a:extLst>
+              <a:ext uri="{FF2B5EF4-FFF2-40B4-BE49-F238E27FC236}">
+                <a16:creationId xmlns:a16="http://schemas.microsoft.com/office/drawing/2014/main" id="{A5653F4B-3C2D-4EE7-9C24-07BB976FA838}"/>
+              </a:ext>
+            </a:extLst>
+          </p:cNvPr>
+          <p:cNvSpPr>
+            <a:spLocks noGrp="1"/>
+          </p:cNvSpPr>
+          <p:nvPr>
+            <p:ph type="title"/>
+          </p:nvPr>
+        </p:nvSpPr>
+        <p:spPr/>
+        <p:txBody>
+          <a:bodyPr/>
+          <a:lstStyle/>
+          <a:p>
+            <a:endParaRPr lang="en-US"/>
+          </a:p>
+        </p:txBody>
+      </p:sp>
+      <p:sp>
+        <p:nvSpPr>
+          <p:cNvPr id="3" name="Content Placeholder 2">
+            <a:extLst>
+              <a:ext uri="{FF2B5EF4-FFF2-40B4-BE49-F238E27FC236}">
+                <a16:creationId xmlns:a16="http://schemas.microsoft.com/office/drawing/2014/main" id="{779C35F5-310E-41B0-B35C-86BC9BFCFCA4}"/>
+              </a:ext>
+            </a:extLst>
+          </p:cNvPr>
+          <p:cNvSpPr>
+            <a:spLocks noGrp="1"/>
+          </p:cNvSpPr>
+          <p:nvPr>
+            <p:ph idx="1"/>
+          </p:nvPr>
+        </p:nvSpPr>
+        <p:spPr/>
+        <p:txBody>
+          <a:bodyPr/>
+          <a:lstStyle/>
+          <a:p>
+            <a:endParaRPr lang="en-US"/>
+          </a:p>
+        </p:txBody>
+      </p:sp>
+      <p:pic>
+        <p:nvPicPr>
+          <p:cNvPr id="4" name="Picture 3">
+            <a:extLst>
+              <a:ext uri="{FF2B5EF4-FFF2-40B4-BE49-F238E27FC236}">
+                <a16:creationId xmlns:a16="http://schemas.microsoft.com/office/drawing/2014/main" id="{27B85621-8AD9-4EC3-84D3-543D94F047CE}"/>
+              </a:ext>
+            </a:extLst>
+          </p:cNvPr>
+          <p:cNvPicPr>
+            <a:picLocks noChangeAspect="1"/>
+          </p:cNvPicPr>
+          <p:nvPr/>
+        </p:nvPicPr>
+        <p:blipFill>
+          <a:blip r:embed="rId2"/>
+          <a:stretch>
+            <a:fillRect/>
+          </a:stretch>
+        </p:blipFill>
+        <p:spPr>
+          <a:xfrm>
+            <a:off x="3996690" y="1371600"/>
+            <a:ext cx="4198620" cy="4114800"/>
+          </a:xfrm>
+          <a:prstGeom prst="rect">
+            <a:avLst/>
+          </a:prstGeom>
+        </p:spPr>
+      </p:pic>
+    </p:spTree>
+    <p:extLst>
+      <p:ext uri="{BB962C8B-B14F-4D97-AF65-F5344CB8AC3E}">
+        <p14:creationId xmlns:p14="http://schemas.microsoft.com/office/powerpoint/2010/main" val="2797949818"/>
+      </p:ext>
+    </p:extLst>
+  </p:cSld>
+  <p:clrMapOvr>
+    <a:masterClrMapping/>
+  </p:clrMapOvr>
+</p:sld>
+</file>
+
 <file path=ppt/slides/slide2.xml><?xml version="1.0" encoding="utf-8"?>
 <p:sld xmlns:a="http://schemas.openxmlformats.org/drawingml/2006/main" xmlns:r="http://schemas.openxmlformats.org/officeDocument/2006/relationships" xmlns:p="http://schemas.openxmlformats.org/presentationml/2006/main">
   <p:cSld>
@@ -46151,24 +46286,6 @@
 </file>
 
 <file path=customXml/item1.xml><?xml version="1.0" encoding="utf-8"?>
-<p:properties xmlns:p="http://schemas.microsoft.com/office/2006/metadata/properties" xmlns:xsi="http://www.w3.org/2001/XMLSchema-instance" xmlns:pc="http://schemas.microsoft.com/office/infopath/2007/PartnerControls">
-  <documentManagement>
-    <_ip_UnifiedCompliancePolicyUIAction xmlns="http://schemas.microsoft.com/sharepoint/v3" xsi:nil="true"/>
-    <_ip_UnifiedCompliancePolicyProperties xmlns="http://schemas.microsoft.com/sharepoint/v3" xsi:nil="true"/>
-  </documentManagement>
-</p:properties>
-</file>
-
-<file path=customXml/item2.xml><?xml version="1.0" encoding="utf-8"?>
-<?mso-contentType ?>
-<FormTemplates xmlns="http://schemas.microsoft.com/sharepoint/v3/contenttype/forms">
-  <Display>DocumentLibraryForm</Display>
-  <Edit>DocumentLibraryForm</Edit>
-  <New>DocumentLibraryForm</New>
-</FormTemplates>
-</file>
-
-<file path=customXml/item3.xml><?xml version="1.0" encoding="utf-8"?>
 <ct:contentTypeSchema xmlns:ct="http://schemas.microsoft.com/office/2006/metadata/contentType" xmlns:ma="http://schemas.microsoft.com/office/2006/metadata/properties/metaAttributes" ct:_="" ma:_="" ma:contentTypeName="Document" ma:contentTypeID="0x010100296A0AFD238ABD48BB3FEC116B19FE24" ma:contentTypeVersion="15" ma:contentTypeDescription="Create a new document." ma:contentTypeScope="" ma:versionID="7c3e7c1417332e10970a086a87badecf">
   <xsd:schema xmlns:xsd="http://www.w3.org/2001/XMLSchema" xmlns:xs="http://www.w3.org/2001/XMLSchema" xmlns:p="http://schemas.microsoft.com/office/2006/metadata/properties" xmlns:ns1="http://schemas.microsoft.com/sharepoint/v3" xmlns:ns3="5bf1cdb5-c436-4499-ab6d-5690f2f1d732" xmlns:ns4="ba67c001-93af-4257-bf63-2b4e71e5b10e" targetNamespace="http://schemas.microsoft.com/office/2006/metadata/properties" ma:root="true" ma:fieldsID="a2ee4304c11717b4b7d9396fa4750e44" ns1:_="" ns3:_="" ns4:_="">
     <xsd:import namespace="http://schemas.microsoft.com/sharepoint/v3"/>
@@ -46408,33 +46525,25 @@
 </ct:contentTypeSchema>
 </file>
 
-<file path=customXml/itemProps1.xml><?xml version="1.0" encoding="utf-8"?>
-<ds:datastoreItem xmlns:ds="http://schemas.openxmlformats.org/officeDocument/2006/customXml" ds:itemID="{A4C13231-B3D5-4054-AA81-57A458BFF0E6}">
-  <ds:schemaRefs>
-    <ds:schemaRef ds:uri="http://schemas.microsoft.com/office/2006/documentManagement/types"/>
-    <ds:schemaRef ds:uri="http://purl.org/dc/dcmitype/"/>
-    <ds:schemaRef ds:uri="http://schemas.microsoft.com/sharepoint/v3"/>
-    <ds:schemaRef ds:uri="http://www.w3.org/XML/1998/namespace"/>
-    <ds:schemaRef ds:uri="http://purl.org/dc/elements/1.1/"/>
-    <ds:schemaRef ds:uri="http://schemas.microsoft.com/office/infopath/2007/PartnerControls"/>
-    <ds:schemaRef ds:uri="5bf1cdb5-c436-4499-ab6d-5690f2f1d732"/>
-    <ds:schemaRef ds:uri="http://schemas.microsoft.com/office/2006/metadata/properties"/>
-    <ds:schemaRef ds:uri="http://schemas.openxmlformats.org/package/2006/metadata/core-properties"/>
-    <ds:schemaRef ds:uri="ba67c001-93af-4257-bf63-2b4e71e5b10e"/>
-    <ds:schemaRef ds:uri="http://purl.org/dc/terms/"/>
-  </ds:schemaRefs>
-</ds:datastoreItem>
+<file path=customXml/item2.xml><?xml version="1.0" encoding="utf-8"?>
+<?mso-contentType ?>
+<FormTemplates xmlns="http://schemas.microsoft.com/sharepoint/v3/contenttype/forms">
+  <Display>DocumentLibraryForm</Display>
+  <Edit>DocumentLibraryForm</Edit>
+  <New>DocumentLibraryForm</New>
+</FormTemplates>
 </file>
 
-<file path=customXml/itemProps2.xml><?xml version="1.0" encoding="utf-8"?>
-<ds:datastoreItem xmlns:ds="http://schemas.openxmlformats.org/officeDocument/2006/customXml" ds:itemID="{36BCD3F6-BE98-40FE-A9B6-5B2219D5428E}">
-  <ds:schemaRefs>
-    <ds:schemaRef ds:uri="http://schemas.microsoft.com/sharepoint/v3/contenttype/forms"/>
-  </ds:schemaRefs>
-</ds:datastoreItem>
+<file path=customXml/item3.xml><?xml version="1.0" encoding="utf-8"?>
+<p:properties xmlns:p="http://schemas.microsoft.com/office/2006/metadata/properties" xmlns:xsi="http://www.w3.org/2001/XMLSchema-instance" xmlns:pc="http://schemas.microsoft.com/office/infopath/2007/PartnerControls">
+  <documentManagement>
+    <_ip_UnifiedCompliancePolicyUIAction xmlns="http://schemas.microsoft.com/sharepoint/v3" xsi:nil="true"/>
+    <_ip_UnifiedCompliancePolicyProperties xmlns="http://schemas.microsoft.com/sharepoint/v3" xsi:nil="true"/>
+  </documentManagement>
+</p:properties>
 </file>
 
-<file path=customXml/itemProps3.xml><?xml version="1.0" encoding="utf-8"?>
+<file path=customXml/itemProps1.xml><?xml version="1.0" encoding="utf-8"?>
 <ds:datastoreItem xmlns:ds="http://schemas.openxmlformats.org/officeDocument/2006/customXml" ds:itemID="{78EFB68A-0DE1-4FD3-9D67-BC5BB242139F}">
   <ds:schemaRefs>
     <ds:schemaRef ds:uri="http://schemas.microsoft.com/office/2006/metadata/contentType"/>
@@ -46452,4 +46561,30 @@
     <ds:schemaRef ds:uri="http://schemas.microsoft.com/internal/obd"/>
   </ds:schemaRefs>
 </ds:datastoreItem>
+</file>
+
+<file path=customXml/itemProps2.xml><?xml version="1.0" encoding="utf-8"?>
+<ds:datastoreItem xmlns:ds="http://schemas.openxmlformats.org/officeDocument/2006/customXml" ds:itemID="{36BCD3F6-BE98-40FE-A9B6-5B2219D5428E}">
+  <ds:schemaRefs>
+    <ds:schemaRef ds:uri="http://schemas.microsoft.com/sharepoint/v3/contenttype/forms"/>
+  </ds:schemaRefs>
+</ds:datastoreItem>
+</file>
+
+<file path=customXml/itemProps3.xml><?xml version="1.0" encoding="utf-8"?>
+<ds:datastoreItem xmlns:ds="http://schemas.openxmlformats.org/officeDocument/2006/customXml" ds:itemID="{A4C13231-B3D5-4054-AA81-57A458BFF0E6}">
+  <ds:schemaRefs>
+    <ds:schemaRef ds:uri="http://schemas.microsoft.com/office/2006/documentManagement/types"/>
+    <ds:schemaRef ds:uri="http://purl.org/dc/dcmitype/"/>
+    <ds:schemaRef ds:uri="http://schemas.microsoft.com/sharepoint/v3"/>
+    <ds:schemaRef ds:uri="http://www.w3.org/XML/1998/namespace"/>
+    <ds:schemaRef ds:uri="http://purl.org/dc/elements/1.1/"/>
+    <ds:schemaRef ds:uri="http://schemas.microsoft.com/office/infopath/2007/PartnerControls"/>
+    <ds:schemaRef ds:uri="5bf1cdb5-c436-4499-ab6d-5690f2f1d732"/>
+    <ds:schemaRef ds:uri="http://schemas.microsoft.com/office/2006/metadata/properties"/>
+    <ds:schemaRef ds:uri="http://schemas.openxmlformats.org/package/2006/metadata/core-properties"/>
+    <ds:schemaRef ds:uri="ba67c001-93af-4257-bf63-2b4e71e5b10e"/>
+    <ds:schemaRef ds:uri="http://purl.org/dc/terms/"/>
+  </ds:schemaRefs>
+</ds:datastoreItem>
 </file>
</xml_diff>